<commit_message>
added generator architecture image
</commit_message>
<xml_diff>
--- a/mdsrc/Architecture.pptx
+++ b/mdsrc/Architecture.pptx
@@ -6,6 +6,7 @@
   </p:sldMasterIdLst>
   <p:sldIdLst>
     <p:sldId id="256" r:id="rId2"/>
+    <p:sldId id="257" r:id="rId3"/>
   </p:sldIdLst>
   <p:sldSz cx="12192000" cy="6858000"/>
   <p:notesSz cx="6858000" cy="9144000"/>
@@ -104,7 +105,16 @@
       </a:defRPr>
     </a:lvl9pPr>
   </p:defaultTextStyle>
+  <p:extLst>
+    <p:ext uri="{EFAFB233-063F-42B5-8137-9DF3F51BA10A}">
+      <p15:sldGuideLst xmlns:p15="http://schemas.microsoft.com/office/powerpoint/2012/main"/>
+    </p:ext>
+  </p:extLst>
 </p:presentation>
+</file>
+
+<file path=ppt/revisionInfo.xml><?xml version="1.0" encoding="utf-8"?>
+<p1510:revInfo xmlns:a="http://schemas.openxmlformats.org/drawingml/2006/main" xmlns:r="http://schemas.openxmlformats.org/officeDocument/2006/relationships" xmlns:p1510="http://schemas.microsoft.com/office/powerpoint/2015/10/main"/>
 </file>
 
 <file path=ppt/slideLayouts/slideLayout1.xml><?xml version="1.0" encoding="utf-8"?>
@@ -254,7 +264,7 @@
           <a:p>
             <a:fld id="{3B62EF3A-973B-4B2E-9206-1B29A5F34DFB}" type="datetimeFigureOut">
               <a:rPr lang="en-US" smtClean="0"/>
-              <a:t>1/11/2018</a:t>
+              <a:t>1/12/2018</a:t>
             </a:fld>
             <a:endParaRPr lang="en-US"/>
           </a:p>
@@ -452,7 +462,7 @@
           <a:p>
             <a:fld id="{3B62EF3A-973B-4B2E-9206-1B29A5F34DFB}" type="datetimeFigureOut">
               <a:rPr lang="en-US" smtClean="0"/>
-              <a:t>1/11/2018</a:t>
+              <a:t>1/12/2018</a:t>
             </a:fld>
             <a:endParaRPr lang="en-US"/>
           </a:p>
@@ -660,7 +670,7 @@
           <a:p>
             <a:fld id="{3B62EF3A-973B-4B2E-9206-1B29A5F34DFB}" type="datetimeFigureOut">
               <a:rPr lang="en-US" smtClean="0"/>
-              <a:t>1/11/2018</a:t>
+              <a:t>1/12/2018</a:t>
             </a:fld>
             <a:endParaRPr lang="en-US"/>
           </a:p>
@@ -858,7 +868,7 @@
           <a:p>
             <a:fld id="{3B62EF3A-973B-4B2E-9206-1B29A5F34DFB}" type="datetimeFigureOut">
               <a:rPr lang="en-US" smtClean="0"/>
-              <a:t>1/11/2018</a:t>
+              <a:t>1/12/2018</a:t>
             </a:fld>
             <a:endParaRPr lang="en-US"/>
           </a:p>
@@ -1133,7 +1143,7 @@
           <a:p>
             <a:fld id="{3B62EF3A-973B-4B2E-9206-1B29A5F34DFB}" type="datetimeFigureOut">
               <a:rPr lang="en-US" smtClean="0"/>
-              <a:t>1/11/2018</a:t>
+              <a:t>1/12/2018</a:t>
             </a:fld>
             <a:endParaRPr lang="en-US"/>
           </a:p>
@@ -1398,7 +1408,7 @@
           <a:p>
             <a:fld id="{3B62EF3A-973B-4B2E-9206-1B29A5F34DFB}" type="datetimeFigureOut">
               <a:rPr lang="en-US" smtClean="0"/>
-              <a:t>1/11/2018</a:t>
+              <a:t>1/12/2018</a:t>
             </a:fld>
             <a:endParaRPr lang="en-US"/>
           </a:p>
@@ -1810,7 +1820,7 @@
           <a:p>
             <a:fld id="{3B62EF3A-973B-4B2E-9206-1B29A5F34DFB}" type="datetimeFigureOut">
               <a:rPr lang="en-US" smtClean="0"/>
-              <a:t>1/11/2018</a:t>
+              <a:t>1/12/2018</a:t>
             </a:fld>
             <a:endParaRPr lang="en-US"/>
           </a:p>
@@ -1951,7 +1961,7 @@
           <a:p>
             <a:fld id="{3B62EF3A-973B-4B2E-9206-1B29A5F34DFB}" type="datetimeFigureOut">
               <a:rPr lang="en-US" smtClean="0"/>
-              <a:t>1/11/2018</a:t>
+              <a:t>1/12/2018</a:t>
             </a:fld>
             <a:endParaRPr lang="en-US"/>
           </a:p>
@@ -2064,7 +2074,7 @@
           <a:p>
             <a:fld id="{3B62EF3A-973B-4B2E-9206-1B29A5F34DFB}" type="datetimeFigureOut">
               <a:rPr lang="en-US" smtClean="0"/>
-              <a:t>1/11/2018</a:t>
+              <a:t>1/12/2018</a:t>
             </a:fld>
             <a:endParaRPr lang="en-US"/>
           </a:p>
@@ -2375,7 +2385,7 @@
           <a:p>
             <a:fld id="{3B62EF3A-973B-4B2E-9206-1B29A5F34DFB}" type="datetimeFigureOut">
               <a:rPr lang="en-US" smtClean="0"/>
-              <a:t>1/11/2018</a:t>
+              <a:t>1/12/2018</a:t>
             </a:fld>
             <a:endParaRPr lang="en-US"/>
           </a:p>
@@ -2663,7 +2673,7 @@
           <a:p>
             <a:fld id="{3B62EF3A-973B-4B2E-9206-1B29A5F34DFB}" type="datetimeFigureOut">
               <a:rPr lang="en-US" smtClean="0"/>
-              <a:t>1/11/2018</a:t>
+              <a:t>1/12/2018</a:t>
             </a:fld>
             <a:endParaRPr lang="en-US"/>
           </a:p>
@@ -2904,7 +2914,7 @@
           <a:p>
             <a:fld id="{3B62EF3A-973B-4B2E-9206-1B29A5F34DFB}" type="datetimeFigureOut">
               <a:rPr lang="en-US" smtClean="0"/>
-              <a:t>1/11/2018</a:t>
+              <a:t>1/12/2018</a:t>
             </a:fld>
             <a:endParaRPr lang="en-US"/>
           </a:p>
@@ -3335,7 +3345,7 @@
         </p:nvSpPr>
         <p:spPr>
           <a:xfrm>
-            <a:off x="204336" y="1614248"/>
+            <a:off x="204336" y="2749833"/>
             <a:ext cx="2089327" cy="2119978"/>
           </a:xfrm>
           <a:prstGeom prst="rect">
@@ -3384,7 +3394,7 @@
         </p:nvSpPr>
         <p:spPr>
           <a:xfrm>
-            <a:off x="4371922" y="1614248"/>
+            <a:off x="4371922" y="2749833"/>
             <a:ext cx="2089327" cy="2119978"/>
           </a:xfrm>
           <a:prstGeom prst="rect">
@@ -3433,7 +3443,7 @@
         </p:nvCxnSpPr>
         <p:spPr>
           <a:xfrm>
-            <a:off x="2293663" y="2160845"/>
+            <a:off x="2293663" y="3296430"/>
             <a:ext cx="2078259" cy="0"/>
           </a:xfrm>
           <a:prstGeom prst="straightConnector1">
@@ -3472,7 +3482,7 @@
         </p:nvCxnSpPr>
         <p:spPr>
           <a:xfrm flipH="1">
-            <a:off x="2293663" y="3305122"/>
+            <a:off x="2293663" y="4440707"/>
             <a:ext cx="2078259" cy="0"/>
           </a:xfrm>
           <a:prstGeom prst="straightConnector1">
@@ -3511,7 +3521,7 @@
         </p:nvSpPr>
         <p:spPr>
           <a:xfrm>
-            <a:off x="7596162" y="1976943"/>
+            <a:off x="7596162" y="3112528"/>
             <a:ext cx="1144277" cy="1394588"/>
           </a:xfrm>
           <a:prstGeom prst="can">
@@ -3564,7 +3574,7 @@
         </p:nvCxnSpPr>
         <p:spPr>
           <a:xfrm>
-            <a:off x="6461249" y="2674237"/>
+            <a:off x="6461249" y="3809822"/>
             <a:ext cx="1134913" cy="0"/>
           </a:xfrm>
           <a:prstGeom prst="straightConnector1">
@@ -3606,7 +3616,7 @@
         </p:nvSpPr>
         <p:spPr>
           <a:xfrm>
-            <a:off x="9875352" y="1609140"/>
+            <a:off x="9875352" y="2744725"/>
             <a:ext cx="2089327" cy="2119978"/>
           </a:xfrm>
           <a:prstGeom prst="rect">
@@ -3657,7 +3667,7 @@
         </p:nvCxnSpPr>
         <p:spPr>
           <a:xfrm>
-            <a:off x="8740439" y="2674237"/>
+            <a:off x="8740439" y="3809822"/>
             <a:ext cx="1134913" cy="0"/>
           </a:xfrm>
           <a:prstGeom prst="straightConnector1">
@@ -3699,7 +3709,7 @@
         </p:nvSpPr>
         <p:spPr>
           <a:xfrm>
-            <a:off x="2293663" y="1514514"/>
+            <a:off x="2293663" y="2650099"/>
             <a:ext cx="2125087" cy="646331"/>
           </a:xfrm>
           <a:prstGeom prst="rect">
@@ -3741,7 +3751,7 @@
         </p:nvSpPr>
         <p:spPr>
           <a:xfrm>
-            <a:off x="2264715" y="2629478"/>
+            <a:off x="2264715" y="3765063"/>
             <a:ext cx="2125087" cy="646331"/>
           </a:xfrm>
           <a:prstGeom prst="rect">
@@ -3783,7 +3793,7 @@
         </p:nvSpPr>
         <p:spPr>
           <a:xfrm>
-            <a:off x="8740439" y="1476320"/>
+            <a:off x="8740439" y="2611905"/>
             <a:ext cx="1088085" cy="1200329"/>
           </a:xfrm>
           <a:prstGeom prst="rect">
@@ -3818,7 +3828,7 @@
         </p:nvSpPr>
         <p:spPr>
           <a:xfrm>
-            <a:off x="1001242" y="4342123"/>
+            <a:off x="1001242" y="5477708"/>
             <a:ext cx="209443" cy="209443"/>
           </a:xfrm>
           <a:prstGeom prst="rect">
@@ -3864,7 +3874,7 @@
         </p:nvSpPr>
         <p:spPr>
           <a:xfrm>
-            <a:off x="1271987" y="4275714"/>
+            <a:off x="1271987" y="5411299"/>
             <a:ext cx="5389340" cy="369332"/>
           </a:xfrm>
           <a:prstGeom prst="rect">
@@ -3907,7 +3917,7 @@
         </p:nvSpPr>
         <p:spPr>
           <a:xfrm>
-            <a:off x="1001242" y="4751470"/>
+            <a:off x="1001242" y="5887055"/>
             <a:ext cx="209443" cy="209443"/>
           </a:xfrm>
           <a:prstGeom prst="rect">
@@ -3953,7 +3963,7 @@
         </p:nvSpPr>
         <p:spPr>
           <a:xfrm>
-            <a:off x="1271987" y="4685061"/>
+            <a:off x="1271987" y="5820646"/>
             <a:ext cx="9149108" cy="369332"/>
           </a:xfrm>
           <a:prstGeom prst="rect">
@@ -4004,7 +4014,7 @@
         </p:nvSpPr>
         <p:spPr>
           <a:xfrm>
-            <a:off x="1001242" y="5160817"/>
+            <a:off x="1001242" y="6296402"/>
             <a:ext cx="209443" cy="209443"/>
           </a:xfrm>
           <a:prstGeom prst="rect">
@@ -4050,7 +4060,7 @@
         </p:nvSpPr>
         <p:spPr>
           <a:xfrm>
-            <a:off x="1271987" y="5094408"/>
+            <a:off x="1271987" y="6229993"/>
             <a:ext cx="3580974" cy="369332"/>
           </a:xfrm>
           <a:prstGeom prst="rect">
@@ -4075,6 +4085,1325 @@
     <p:extLst>
       <p:ext uri="{BB962C8B-B14F-4D97-AF65-F5344CB8AC3E}">
         <p14:creationId xmlns:p14="http://schemas.microsoft.com/office/powerpoint/2010/main" val="2586926140"/>
+      </p:ext>
+    </p:extLst>
+  </p:cSld>
+  <p:clrMapOvr>
+    <a:masterClrMapping/>
+  </p:clrMapOvr>
+</p:sld>
+</file>
+
+<file path=ppt/slides/slide2.xml><?xml version="1.0" encoding="utf-8"?>
+<p:sld xmlns:a="http://schemas.openxmlformats.org/drawingml/2006/main" xmlns:r="http://schemas.openxmlformats.org/officeDocument/2006/relationships" xmlns:p="http://schemas.openxmlformats.org/presentationml/2006/main">
+  <p:cSld>
+    <p:spTree>
+      <p:nvGrpSpPr>
+        <p:cNvPr id="1" name=""/>
+        <p:cNvGrpSpPr/>
+        <p:nvPr/>
+      </p:nvGrpSpPr>
+      <p:grpSpPr>
+        <a:xfrm>
+          <a:off x="0" y="0"/>
+          <a:ext cx="0" cy="0"/>
+          <a:chOff x="0" y="0"/>
+          <a:chExt cx="0" cy="0"/>
+        </a:xfrm>
+      </p:grpSpPr>
+      <p:sp>
+        <p:nvSpPr>
+          <p:cNvPr id="6" name="Rectangle 5">
+            <a:extLst>
+              <a:ext uri="{FF2B5EF4-FFF2-40B4-BE49-F238E27FC236}">
+                <a16:creationId xmlns:a16="http://schemas.microsoft.com/office/drawing/2014/main" id="{3A19A39B-52B4-4C71-B096-EE80C0CBB28E}"/>
+              </a:ext>
+            </a:extLst>
+          </p:cNvPr>
+          <p:cNvSpPr/>
+          <p:nvPr/>
+        </p:nvSpPr>
+        <p:spPr>
+          <a:xfrm>
+            <a:off x="887684" y="1018753"/>
+            <a:ext cx="1312854" cy="1312854"/>
+          </a:xfrm>
+          <a:prstGeom prst="rect">
+            <a:avLst/>
+          </a:prstGeom>
+        </p:spPr>
+        <p:style>
+          <a:lnRef idx="2">
+            <a:schemeClr val="accent6">
+              <a:shade val="50000"/>
+            </a:schemeClr>
+          </a:lnRef>
+          <a:fillRef idx="1">
+            <a:schemeClr val="accent6"/>
+          </a:fillRef>
+          <a:effectRef idx="0">
+            <a:schemeClr val="accent6"/>
+          </a:effectRef>
+          <a:fontRef idx="minor">
+            <a:schemeClr val="lt1"/>
+          </a:fontRef>
+        </p:style>
+        <p:txBody>
+          <a:bodyPr rtlCol="0" anchor="ctr"/>
+          <a:lstStyle/>
+          <a:p>
+            <a:pPr algn="ctr"/>
+            <a:r>
+              <a:rPr lang="en-US" dirty="0"/>
+              <a:t>Model File</a:t>
+            </a:r>
+          </a:p>
+        </p:txBody>
+      </p:sp>
+      <p:sp>
+        <p:nvSpPr>
+          <p:cNvPr id="7" name="Rectangle 6">
+            <a:extLst>
+              <a:ext uri="{FF2B5EF4-FFF2-40B4-BE49-F238E27FC236}">
+                <a16:creationId xmlns:a16="http://schemas.microsoft.com/office/drawing/2014/main" id="{B6806CB5-6C54-48DF-8BA1-10643E1E5601}"/>
+              </a:ext>
+            </a:extLst>
+          </p:cNvPr>
+          <p:cNvSpPr/>
+          <p:nvPr/>
+        </p:nvSpPr>
+        <p:spPr>
+          <a:xfrm>
+            <a:off x="886631" y="2633001"/>
+            <a:ext cx="1312854" cy="1312854"/>
+          </a:xfrm>
+          <a:prstGeom prst="rect">
+            <a:avLst/>
+          </a:prstGeom>
+        </p:spPr>
+        <p:style>
+          <a:lnRef idx="2">
+            <a:schemeClr val="accent6">
+              <a:shade val="50000"/>
+            </a:schemeClr>
+          </a:lnRef>
+          <a:fillRef idx="1">
+            <a:schemeClr val="accent6"/>
+          </a:fillRef>
+          <a:effectRef idx="0">
+            <a:schemeClr val="accent6"/>
+          </a:effectRef>
+          <a:fontRef idx="minor">
+            <a:schemeClr val="lt1"/>
+          </a:fontRef>
+        </p:style>
+        <p:txBody>
+          <a:bodyPr rtlCol="0" anchor="ctr"/>
+          <a:lstStyle/>
+          <a:p>
+            <a:pPr algn="ctr"/>
+            <a:r>
+              <a:rPr lang="en-US" dirty="0"/>
+              <a:t>Target File</a:t>
+            </a:r>
+          </a:p>
+        </p:txBody>
+      </p:sp>
+      <p:sp>
+        <p:nvSpPr>
+          <p:cNvPr id="8" name="Flowchart: Summing Junction 7">
+            <a:extLst>
+              <a:ext uri="{FF2B5EF4-FFF2-40B4-BE49-F238E27FC236}">
+                <a16:creationId xmlns:a16="http://schemas.microsoft.com/office/drawing/2014/main" id="{33519D51-ED68-46C5-89F6-1FCBEB4B03ED}"/>
+              </a:ext>
+            </a:extLst>
+          </p:cNvPr>
+          <p:cNvSpPr/>
+          <p:nvPr/>
+        </p:nvSpPr>
+        <p:spPr>
+          <a:xfrm>
+            <a:off x="2505203" y="2331607"/>
+            <a:ext cx="301394" cy="301394"/>
+          </a:xfrm>
+          <a:prstGeom prst="flowChartSummingJunction">
+            <a:avLst/>
+          </a:prstGeom>
+        </p:spPr>
+        <p:style>
+          <a:lnRef idx="2">
+            <a:schemeClr val="accent1"/>
+          </a:lnRef>
+          <a:fillRef idx="1">
+            <a:schemeClr val="lt1"/>
+          </a:fillRef>
+          <a:effectRef idx="0">
+            <a:schemeClr val="accent1"/>
+          </a:effectRef>
+          <a:fontRef idx="minor">
+            <a:schemeClr val="dk1"/>
+          </a:fontRef>
+        </p:style>
+        <p:txBody>
+          <a:bodyPr rtlCol="0" anchor="ctr"/>
+          <a:lstStyle/>
+          <a:p>
+            <a:pPr algn="ctr"/>
+            <a:endParaRPr lang="en-US"/>
+          </a:p>
+        </p:txBody>
+      </p:sp>
+      <p:cxnSp>
+        <p:nvCxnSpPr>
+          <p:cNvPr id="10" name="Straight Arrow Connector 9">
+            <a:extLst>
+              <a:ext uri="{FF2B5EF4-FFF2-40B4-BE49-F238E27FC236}">
+                <a16:creationId xmlns:a16="http://schemas.microsoft.com/office/drawing/2014/main" id="{BE0AB85E-5009-4092-AEFE-8F573FB9AAE9}"/>
+              </a:ext>
+            </a:extLst>
+          </p:cNvPr>
+          <p:cNvCxnSpPr>
+            <a:cxnSpLocks/>
+            <a:stCxn id="6" idx="3"/>
+            <a:endCxn id="8" idx="1"/>
+          </p:cNvCxnSpPr>
+          <p:nvPr/>
+        </p:nvCxnSpPr>
+        <p:spPr>
+          <a:xfrm>
+            <a:off x="2200538" y="1675180"/>
+            <a:ext cx="348803" cy="700565"/>
+          </a:xfrm>
+          <a:prstGeom prst="straightConnector1">
+            <a:avLst/>
+          </a:prstGeom>
+          <a:ln>
+            <a:tailEnd type="triangle"/>
+          </a:ln>
+        </p:spPr>
+        <p:style>
+          <a:lnRef idx="1">
+            <a:schemeClr val="accent1"/>
+          </a:lnRef>
+          <a:fillRef idx="0">
+            <a:schemeClr val="accent1"/>
+          </a:fillRef>
+          <a:effectRef idx="0">
+            <a:schemeClr val="accent1"/>
+          </a:effectRef>
+          <a:fontRef idx="minor">
+            <a:schemeClr val="tx1"/>
+          </a:fontRef>
+        </p:style>
+      </p:cxnSp>
+      <p:cxnSp>
+        <p:nvCxnSpPr>
+          <p:cNvPr id="12" name="Straight Arrow Connector 11">
+            <a:extLst>
+              <a:ext uri="{FF2B5EF4-FFF2-40B4-BE49-F238E27FC236}">
+                <a16:creationId xmlns:a16="http://schemas.microsoft.com/office/drawing/2014/main" id="{1DC9914A-48BE-4881-8F8B-8D4123472113}"/>
+              </a:ext>
+            </a:extLst>
+          </p:cNvPr>
+          <p:cNvCxnSpPr>
+            <a:cxnSpLocks/>
+            <a:stCxn id="7" idx="3"/>
+            <a:endCxn id="8" idx="3"/>
+          </p:cNvCxnSpPr>
+          <p:nvPr/>
+        </p:nvCxnSpPr>
+        <p:spPr>
+          <a:xfrm flipV="1">
+            <a:off x="2199485" y="2588863"/>
+            <a:ext cx="349856" cy="700565"/>
+          </a:xfrm>
+          <a:prstGeom prst="straightConnector1">
+            <a:avLst/>
+          </a:prstGeom>
+          <a:ln>
+            <a:tailEnd type="triangle"/>
+          </a:ln>
+        </p:spPr>
+        <p:style>
+          <a:lnRef idx="1">
+            <a:schemeClr val="accent1"/>
+          </a:lnRef>
+          <a:fillRef idx="0">
+            <a:schemeClr val="accent1"/>
+          </a:fillRef>
+          <a:effectRef idx="0">
+            <a:schemeClr val="accent1"/>
+          </a:effectRef>
+          <a:fontRef idx="minor">
+            <a:schemeClr val="tx1"/>
+          </a:fontRef>
+        </p:style>
+      </p:cxnSp>
+      <p:sp>
+        <p:nvSpPr>
+          <p:cNvPr id="19" name="Rectangle 18">
+            <a:extLst>
+              <a:ext uri="{FF2B5EF4-FFF2-40B4-BE49-F238E27FC236}">
+                <a16:creationId xmlns:a16="http://schemas.microsoft.com/office/drawing/2014/main" id="{6D78BED8-48B5-47E8-A773-64EF3EEF63F5}"/>
+              </a:ext>
+            </a:extLst>
+          </p:cNvPr>
+          <p:cNvSpPr/>
+          <p:nvPr/>
+        </p:nvSpPr>
+        <p:spPr>
+          <a:xfrm>
+            <a:off x="3802109" y="-352067"/>
+            <a:ext cx="1312854" cy="1312854"/>
+          </a:xfrm>
+          <a:prstGeom prst="rect">
+            <a:avLst/>
+          </a:prstGeom>
+        </p:spPr>
+        <p:style>
+          <a:lnRef idx="2">
+            <a:schemeClr val="accent1">
+              <a:shade val="50000"/>
+            </a:schemeClr>
+          </a:lnRef>
+          <a:fillRef idx="1">
+            <a:schemeClr val="accent1"/>
+          </a:fillRef>
+          <a:effectRef idx="0">
+            <a:schemeClr val="accent1"/>
+          </a:effectRef>
+          <a:fontRef idx="minor">
+            <a:schemeClr val="lt1"/>
+          </a:fontRef>
+        </p:style>
+        <p:txBody>
+          <a:bodyPr rtlCol="0" anchor="ctr"/>
+          <a:lstStyle/>
+          <a:p>
+            <a:pPr algn="ctr"/>
+            <a:r>
+              <a:rPr lang="en-US" dirty="0"/>
+              <a:t>Front End Template</a:t>
+            </a:r>
+          </a:p>
+        </p:txBody>
+      </p:sp>
+      <p:sp>
+        <p:nvSpPr>
+          <p:cNvPr id="20" name="Rectangle 19">
+            <a:extLst>
+              <a:ext uri="{FF2B5EF4-FFF2-40B4-BE49-F238E27FC236}">
+                <a16:creationId xmlns:a16="http://schemas.microsoft.com/office/drawing/2014/main" id="{4C5E4E7F-1E60-48D4-989E-98990D7746FC}"/>
+              </a:ext>
+            </a:extLst>
+          </p:cNvPr>
+          <p:cNvSpPr/>
+          <p:nvPr/>
+        </p:nvSpPr>
+        <p:spPr>
+          <a:xfrm>
+            <a:off x="3802109" y="1719318"/>
+            <a:ext cx="1312854" cy="1312854"/>
+          </a:xfrm>
+          <a:prstGeom prst="rect">
+            <a:avLst/>
+          </a:prstGeom>
+        </p:spPr>
+        <p:style>
+          <a:lnRef idx="2">
+            <a:schemeClr val="accent1">
+              <a:shade val="50000"/>
+            </a:schemeClr>
+          </a:lnRef>
+          <a:fillRef idx="1">
+            <a:schemeClr val="accent1"/>
+          </a:fillRef>
+          <a:effectRef idx="0">
+            <a:schemeClr val="accent1"/>
+          </a:effectRef>
+          <a:fontRef idx="minor">
+            <a:schemeClr val="lt1"/>
+          </a:fontRef>
+        </p:style>
+        <p:txBody>
+          <a:bodyPr rtlCol="0" anchor="ctr"/>
+          <a:lstStyle/>
+          <a:p>
+            <a:pPr algn="ctr"/>
+            <a:r>
+              <a:rPr lang="en-US" dirty="0"/>
+              <a:t>Back End Template</a:t>
+            </a:r>
+          </a:p>
+        </p:txBody>
+      </p:sp>
+      <p:sp>
+        <p:nvSpPr>
+          <p:cNvPr id="21" name="Rectangle 20">
+            <a:extLst>
+              <a:ext uri="{FF2B5EF4-FFF2-40B4-BE49-F238E27FC236}">
+                <a16:creationId xmlns:a16="http://schemas.microsoft.com/office/drawing/2014/main" id="{CB4E04E2-BA4F-4AB7-AAD1-0A79343AE849}"/>
+              </a:ext>
+            </a:extLst>
+          </p:cNvPr>
+          <p:cNvSpPr/>
+          <p:nvPr/>
+        </p:nvSpPr>
+        <p:spPr>
+          <a:xfrm>
+            <a:off x="3802109" y="3790829"/>
+            <a:ext cx="1312854" cy="1312854"/>
+          </a:xfrm>
+          <a:prstGeom prst="rect">
+            <a:avLst/>
+          </a:prstGeom>
+        </p:spPr>
+        <p:style>
+          <a:lnRef idx="2">
+            <a:schemeClr val="accent1">
+              <a:shade val="50000"/>
+            </a:schemeClr>
+          </a:lnRef>
+          <a:fillRef idx="1">
+            <a:schemeClr val="accent1"/>
+          </a:fillRef>
+          <a:effectRef idx="0">
+            <a:schemeClr val="accent1"/>
+          </a:effectRef>
+          <a:fontRef idx="minor">
+            <a:schemeClr val="lt1"/>
+          </a:fontRef>
+        </p:style>
+        <p:txBody>
+          <a:bodyPr rtlCol="0" anchor="ctr"/>
+          <a:lstStyle/>
+          <a:p>
+            <a:pPr algn="ctr"/>
+            <a:r>
+              <a:rPr lang="en-US" dirty="0"/>
+              <a:t>Binding Template</a:t>
+            </a:r>
+          </a:p>
+        </p:txBody>
+      </p:sp>
+      <p:sp>
+        <p:nvSpPr>
+          <p:cNvPr id="22" name="Flowchart: Summing Junction 21">
+            <a:extLst>
+              <a:ext uri="{FF2B5EF4-FFF2-40B4-BE49-F238E27FC236}">
+                <a16:creationId xmlns:a16="http://schemas.microsoft.com/office/drawing/2014/main" id="{FC1279C3-F202-45E3-A6AF-2F837B3FF3A3}"/>
+              </a:ext>
+            </a:extLst>
+          </p:cNvPr>
+          <p:cNvSpPr/>
+          <p:nvPr/>
+        </p:nvSpPr>
+        <p:spPr>
+          <a:xfrm>
+            <a:off x="4307839" y="1132714"/>
+            <a:ext cx="301394" cy="301394"/>
+          </a:xfrm>
+          <a:prstGeom prst="flowChartSummingJunction">
+            <a:avLst/>
+          </a:prstGeom>
+        </p:spPr>
+        <p:style>
+          <a:lnRef idx="2">
+            <a:schemeClr val="accent1"/>
+          </a:lnRef>
+          <a:fillRef idx="1">
+            <a:schemeClr val="lt1"/>
+          </a:fillRef>
+          <a:effectRef idx="0">
+            <a:schemeClr val="accent1"/>
+          </a:effectRef>
+          <a:fontRef idx="minor">
+            <a:schemeClr val="dk1"/>
+          </a:fontRef>
+        </p:style>
+        <p:txBody>
+          <a:bodyPr rtlCol="0" anchor="ctr"/>
+          <a:lstStyle/>
+          <a:p>
+            <a:pPr algn="ctr"/>
+            <a:endParaRPr lang="en-US"/>
+          </a:p>
+        </p:txBody>
+      </p:sp>
+      <p:sp>
+        <p:nvSpPr>
+          <p:cNvPr id="23" name="Flowchart: Summing Junction 22">
+            <a:extLst>
+              <a:ext uri="{FF2B5EF4-FFF2-40B4-BE49-F238E27FC236}">
+                <a16:creationId xmlns:a16="http://schemas.microsoft.com/office/drawing/2014/main" id="{A37756F6-1070-428C-8ECC-6111E5A755E3}"/>
+              </a:ext>
+            </a:extLst>
+          </p:cNvPr>
+          <p:cNvSpPr/>
+          <p:nvPr/>
+        </p:nvSpPr>
+        <p:spPr>
+          <a:xfrm>
+            <a:off x="4307839" y="3209688"/>
+            <a:ext cx="301394" cy="301394"/>
+          </a:xfrm>
+          <a:prstGeom prst="flowChartSummingJunction">
+            <a:avLst/>
+          </a:prstGeom>
+        </p:spPr>
+        <p:style>
+          <a:lnRef idx="2">
+            <a:schemeClr val="accent1"/>
+          </a:lnRef>
+          <a:fillRef idx="1">
+            <a:schemeClr val="lt1"/>
+          </a:fillRef>
+          <a:effectRef idx="0">
+            <a:schemeClr val="accent1"/>
+          </a:effectRef>
+          <a:fontRef idx="minor">
+            <a:schemeClr val="dk1"/>
+          </a:fontRef>
+        </p:style>
+        <p:txBody>
+          <a:bodyPr rtlCol="0" anchor="ctr"/>
+          <a:lstStyle/>
+          <a:p>
+            <a:pPr algn="ctr"/>
+            <a:endParaRPr lang="en-US"/>
+          </a:p>
+        </p:txBody>
+      </p:sp>
+      <p:sp>
+        <p:nvSpPr>
+          <p:cNvPr id="24" name="Flowchart: Summing Junction 23">
+            <a:extLst>
+              <a:ext uri="{FF2B5EF4-FFF2-40B4-BE49-F238E27FC236}">
+                <a16:creationId xmlns:a16="http://schemas.microsoft.com/office/drawing/2014/main" id="{045EE990-FFF7-43F3-B88E-5EEA738271FF}"/>
+              </a:ext>
+            </a:extLst>
+          </p:cNvPr>
+          <p:cNvSpPr/>
+          <p:nvPr/>
+        </p:nvSpPr>
+        <p:spPr>
+          <a:xfrm>
+            <a:off x="4307839" y="5243383"/>
+            <a:ext cx="301394" cy="301394"/>
+          </a:xfrm>
+          <a:prstGeom prst="flowChartSummingJunction">
+            <a:avLst/>
+          </a:prstGeom>
+        </p:spPr>
+        <p:style>
+          <a:lnRef idx="2">
+            <a:schemeClr val="accent1"/>
+          </a:lnRef>
+          <a:fillRef idx="1">
+            <a:schemeClr val="lt1"/>
+          </a:fillRef>
+          <a:effectRef idx="0">
+            <a:schemeClr val="accent1"/>
+          </a:effectRef>
+          <a:fontRef idx="minor">
+            <a:schemeClr val="dk1"/>
+          </a:fontRef>
+        </p:style>
+        <p:txBody>
+          <a:bodyPr rtlCol="0" anchor="ctr"/>
+          <a:lstStyle/>
+          <a:p>
+            <a:pPr algn="ctr"/>
+            <a:endParaRPr lang="en-US"/>
+          </a:p>
+        </p:txBody>
+      </p:sp>
+      <p:cxnSp>
+        <p:nvCxnSpPr>
+          <p:cNvPr id="26" name="Straight Arrow Connector 25">
+            <a:extLst>
+              <a:ext uri="{FF2B5EF4-FFF2-40B4-BE49-F238E27FC236}">
+                <a16:creationId xmlns:a16="http://schemas.microsoft.com/office/drawing/2014/main" id="{B58253C1-4ECB-4CAE-B3DE-0245B1028A5E}"/>
+              </a:ext>
+            </a:extLst>
+          </p:cNvPr>
+          <p:cNvCxnSpPr>
+            <a:cxnSpLocks/>
+            <a:stCxn id="19" idx="2"/>
+            <a:endCxn id="22" idx="0"/>
+          </p:cNvCxnSpPr>
+          <p:nvPr/>
+        </p:nvCxnSpPr>
+        <p:spPr>
+          <a:xfrm>
+            <a:off x="4458536" y="960787"/>
+            <a:ext cx="0" cy="171927"/>
+          </a:xfrm>
+          <a:prstGeom prst="straightConnector1">
+            <a:avLst/>
+          </a:prstGeom>
+          <a:ln>
+            <a:tailEnd type="triangle"/>
+          </a:ln>
+        </p:spPr>
+        <p:style>
+          <a:lnRef idx="1">
+            <a:schemeClr val="accent1"/>
+          </a:lnRef>
+          <a:fillRef idx="0">
+            <a:schemeClr val="accent1"/>
+          </a:fillRef>
+          <a:effectRef idx="0">
+            <a:schemeClr val="accent1"/>
+          </a:effectRef>
+          <a:fontRef idx="minor">
+            <a:schemeClr val="tx1"/>
+          </a:fontRef>
+        </p:style>
+      </p:cxnSp>
+      <p:cxnSp>
+        <p:nvCxnSpPr>
+          <p:cNvPr id="28" name="Straight Arrow Connector 27">
+            <a:extLst>
+              <a:ext uri="{FF2B5EF4-FFF2-40B4-BE49-F238E27FC236}">
+                <a16:creationId xmlns:a16="http://schemas.microsoft.com/office/drawing/2014/main" id="{E2F31100-7A94-4168-B6FB-27EDE4412232}"/>
+              </a:ext>
+            </a:extLst>
+          </p:cNvPr>
+          <p:cNvCxnSpPr>
+            <a:cxnSpLocks/>
+            <a:stCxn id="20" idx="2"/>
+            <a:endCxn id="23" idx="0"/>
+          </p:cNvCxnSpPr>
+          <p:nvPr/>
+        </p:nvCxnSpPr>
+        <p:spPr>
+          <a:xfrm>
+            <a:off x="4458536" y="3032172"/>
+            <a:ext cx="0" cy="177516"/>
+          </a:xfrm>
+          <a:prstGeom prst="straightConnector1">
+            <a:avLst/>
+          </a:prstGeom>
+          <a:ln>
+            <a:tailEnd type="triangle"/>
+          </a:ln>
+        </p:spPr>
+        <p:style>
+          <a:lnRef idx="1">
+            <a:schemeClr val="accent1"/>
+          </a:lnRef>
+          <a:fillRef idx="0">
+            <a:schemeClr val="accent1"/>
+          </a:fillRef>
+          <a:effectRef idx="0">
+            <a:schemeClr val="accent1"/>
+          </a:effectRef>
+          <a:fontRef idx="minor">
+            <a:schemeClr val="tx1"/>
+          </a:fontRef>
+        </p:style>
+      </p:cxnSp>
+      <p:cxnSp>
+        <p:nvCxnSpPr>
+          <p:cNvPr id="30" name="Straight Arrow Connector 29">
+            <a:extLst>
+              <a:ext uri="{FF2B5EF4-FFF2-40B4-BE49-F238E27FC236}">
+                <a16:creationId xmlns:a16="http://schemas.microsoft.com/office/drawing/2014/main" id="{EEA60CA8-F8CD-4F88-8DDF-FF2043EF7498}"/>
+              </a:ext>
+            </a:extLst>
+          </p:cNvPr>
+          <p:cNvCxnSpPr>
+            <a:cxnSpLocks/>
+            <a:stCxn id="21" idx="2"/>
+            <a:endCxn id="24" idx="0"/>
+          </p:cNvCxnSpPr>
+          <p:nvPr/>
+        </p:nvCxnSpPr>
+        <p:spPr>
+          <a:xfrm>
+            <a:off x="4458536" y="5103683"/>
+            <a:ext cx="0" cy="139700"/>
+          </a:xfrm>
+          <a:prstGeom prst="straightConnector1">
+            <a:avLst/>
+          </a:prstGeom>
+          <a:ln>
+            <a:tailEnd type="triangle"/>
+          </a:ln>
+        </p:spPr>
+        <p:style>
+          <a:lnRef idx="1">
+            <a:schemeClr val="accent1"/>
+          </a:lnRef>
+          <a:fillRef idx="0">
+            <a:schemeClr val="accent1"/>
+          </a:fillRef>
+          <a:effectRef idx="0">
+            <a:schemeClr val="accent1"/>
+          </a:effectRef>
+          <a:fontRef idx="minor">
+            <a:schemeClr val="tx1"/>
+          </a:fontRef>
+        </p:style>
+      </p:cxnSp>
+      <p:sp>
+        <p:nvSpPr>
+          <p:cNvPr id="38" name="Rectangle 37">
+            <a:extLst>
+              <a:ext uri="{FF2B5EF4-FFF2-40B4-BE49-F238E27FC236}">
+                <a16:creationId xmlns:a16="http://schemas.microsoft.com/office/drawing/2014/main" id="{C7A51334-C247-4D74-B4A8-E9BAC60B070C}"/>
+              </a:ext>
+            </a:extLst>
+          </p:cNvPr>
+          <p:cNvSpPr/>
+          <p:nvPr/>
+        </p:nvSpPr>
+        <p:spPr>
+          <a:xfrm>
+            <a:off x="6154613" y="626984"/>
+            <a:ext cx="1312854" cy="1312854"/>
+          </a:xfrm>
+          <a:prstGeom prst="rect">
+            <a:avLst/>
+          </a:prstGeom>
+        </p:spPr>
+        <p:style>
+          <a:lnRef idx="2">
+            <a:schemeClr val="accent2">
+              <a:shade val="50000"/>
+            </a:schemeClr>
+          </a:lnRef>
+          <a:fillRef idx="1">
+            <a:schemeClr val="accent2"/>
+          </a:fillRef>
+          <a:effectRef idx="0">
+            <a:schemeClr val="accent2"/>
+          </a:effectRef>
+          <a:fontRef idx="minor">
+            <a:schemeClr val="lt1"/>
+          </a:fontRef>
+        </p:style>
+        <p:txBody>
+          <a:bodyPr rtlCol="0" anchor="ctr"/>
+          <a:lstStyle/>
+          <a:p>
+            <a:pPr algn="ctr"/>
+            <a:r>
+              <a:rPr lang="en-US" dirty="0"/>
+              <a:t>Front End Code</a:t>
+            </a:r>
+          </a:p>
+        </p:txBody>
+      </p:sp>
+      <p:sp>
+        <p:nvSpPr>
+          <p:cNvPr id="39" name="Rectangle 38">
+            <a:extLst>
+              <a:ext uri="{FF2B5EF4-FFF2-40B4-BE49-F238E27FC236}">
+                <a16:creationId xmlns:a16="http://schemas.microsoft.com/office/drawing/2014/main" id="{B1A5CBB1-CF6D-4AC3-AC6F-B65FB7EC83F8}"/>
+              </a:ext>
+            </a:extLst>
+          </p:cNvPr>
+          <p:cNvSpPr/>
+          <p:nvPr/>
+        </p:nvSpPr>
+        <p:spPr>
+          <a:xfrm>
+            <a:off x="6154613" y="2700686"/>
+            <a:ext cx="1312854" cy="1312854"/>
+          </a:xfrm>
+          <a:prstGeom prst="rect">
+            <a:avLst/>
+          </a:prstGeom>
+        </p:spPr>
+        <p:style>
+          <a:lnRef idx="2">
+            <a:schemeClr val="accent2">
+              <a:shade val="50000"/>
+            </a:schemeClr>
+          </a:lnRef>
+          <a:fillRef idx="1">
+            <a:schemeClr val="accent2"/>
+          </a:fillRef>
+          <a:effectRef idx="0">
+            <a:schemeClr val="accent2"/>
+          </a:effectRef>
+          <a:fontRef idx="minor">
+            <a:schemeClr val="lt1"/>
+          </a:fontRef>
+        </p:style>
+        <p:txBody>
+          <a:bodyPr rtlCol="0" anchor="ctr"/>
+          <a:lstStyle/>
+          <a:p>
+            <a:pPr algn="ctr"/>
+            <a:r>
+              <a:rPr lang="en-US" dirty="0"/>
+              <a:t>Back End Code</a:t>
+            </a:r>
+          </a:p>
+        </p:txBody>
+      </p:sp>
+      <p:sp>
+        <p:nvSpPr>
+          <p:cNvPr id="40" name="Rectangle 39">
+            <a:extLst>
+              <a:ext uri="{FF2B5EF4-FFF2-40B4-BE49-F238E27FC236}">
+                <a16:creationId xmlns:a16="http://schemas.microsoft.com/office/drawing/2014/main" id="{68F0E333-8704-4EF1-A3C3-6FC14B1DC2C6}"/>
+              </a:ext>
+            </a:extLst>
+          </p:cNvPr>
+          <p:cNvSpPr/>
+          <p:nvPr/>
+        </p:nvSpPr>
+        <p:spPr>
+          <a:xfrm>
+            <a:off x="6154613" y="4738631"/>
+            <a:ext cx="1312854" cy="1312854"/>
+          </a:xfrm>
+          <a:prstGeom prst="rect">
+            <a:avLst/>
+          </a:prstGeom>
+        </p:spPr>
+        <p:style>
+          <a:lnRef idx="2">
+            <a:schemeClr val="accent2">
+              <a:shade val="50000"/>
+            </a:schemeClr>
+          </a:lnRef>
+          <a:fillRef idx="1">
+            <a:schemeClr val="accent2"/>
+          </a:fillRef>
+          <a:effectRef idx="0">
+            <a:schemeClr val="accent2"/>
+          </a:effectRef>
+          <a:fontRef idx="minor">
+            <a:schemeClr val="lt1"/>
+          </a:fontRef>
+        </p:style>
+        <p:txBody>
+          <a:bodyPr rtlCol="0" anchor="ctr"/>
+          <a:lstStyle/>
+          <a:p>
+            <a:pPr algn="ctr"/>
+            <a:r>
+              <a:rPr lang="en-US" dirty="0"/>
+              <a:t>Binding Code</a:t>
+            </a:r>
+          </a:p>
+        </p:txBody>
+      </p:sp>
+      <p:cxnSp>
+        <p:nvCxnSpPr>
+          <p:cNvPr id="42" name="Straight Arrow Connector 41">
+            <a:extLst>
+              <a:ext uri="{FF2B5EF4-FFF2-40B4-BE49-F238E27FC236}">
+                <a16:creationId xmlns:a16="http://schemas.microsoft.com/office/drawing/2014/main" id="{1E523BA1-EF89-4893-9A15-2532AFBFCC34}"/>
+              </a:ext>
+            </a:extLst>
+          </p:cNvPr>
+          <p:cNvCxnSpPr>
+            <a:stCxn id="22" idx="6"/>
+            <a:endCxn id="38" idx="1"/>
+          </p:cNvCxnSpPr>
+          <p:nvPr/>
+        </p:nvCxnSpPr>
+        <p:spPr>
+          <a:xfrm>
+            <a:off x="4609233" y="1283411"/>
+            <a:ext cx="1545380" cy="0"/>
+          </a:xfrm>
+          <a:prstGeom prst="straightConnector1">
+            <a:avLst/>
+          </a:prstGeom>
+          <a:ln>
+            <a:tailEnd type="triangle"/>
+          </a:ln>
+        </p:spPr>
+        <p:style>
+          <a:lnRef idx="1">
+            <a:schemeClr val="accent1"/>
+          </a:lnRef>
+          <a:fillRef idx="0">
+            <a:schemeClr val="accent1"/>
+          </a:fillRef>
+          <a:effectRef idx="0">
+            <a:schemeClr val="accent1"/>
+          </a:effectRef>
+          <a:fontRef idx="minor">
+            <a:schemeClr val="tx1"/>
+          </a:fontRef>
+        </p:style>
+      </p:cxnSp>
+      <p:cxnSp>
+        <p:nvCxnSpPr>
+          <p:cNvPr id="101" name="Straight Arrow Connector 100">
+            <a:extLst>
+              <a:ext uri="{FF2B5EF4-FFF2-40B4-BE49-F238E27FC236}">
+                <a16:creationId xmlns:a16="http://schemas.microsoft.com/office/drawing/2014/main" id="{36BBBC23-361F-45DD-903B-E9FFE82C77A4}"/>
+              </a:ext>
+            </a:extLst>
+          </p:cNvPr>
+          <p:cNvCxnSpPr>
+            <a:cxnSpLocks/>
+            <a:stCxn id="23" idx="6"/>
+            <a:endCxn id="39" idx="1"/>
+          </p:cNvCxnSpPr>
+          <p:nvPr/>
+        </p:nvCxnSpPr>
+        <p:spPr>
+          <a:xfrm flipV="1">
+            <a:off x="4609233" y="3357113"/>
+            <a:ext cx="1545380" cy="3272"/>
+          </a:xfrm>
+          <a:prstGeom prst="straightConnector1">
+            <a:avLst/>
+          </a:prstGeom>
+          <a:ln>
+            <a:tailEnd type="triangle"/>
+          </a:ln>
+        </p:spPr>
+        <p:style>
+          <a:lnRef idx="1">
+            <a:schemeClr val="accent1"/>
+          </a:lnRef>
+          <a:fillRef idx="0">
+            <a:schemeClr val="accent1"/>
+          </a:fillRef>
+          <a:effectRef idx="0">
+            <a:schemeClr val="accent1"/>
+          </a:effectRef>
+          <a:fontRef idx="minor">
+            <a:schemeClr val="tx1"/>
+          </a:fontRef>
+        </p:style>
+      </p:cxnSp>
+      <p:cxnSp>
+        <p:nvCxnSpPr>
+          <p:cNvPr id="107" name="Straight Arrow Connector 106">
+            <a:extLst>
+              <a:ext uri="{FF2B5EF4-FFF2-40B4-BE49-F238E27FC236}">
+                <a16:creationId xmlns:a16="http://schemas.microsoft.com/office/drawing/2014/main" id="{C6438663-D208-4984-BF71-226360483400}"/>
+              </a:ext>
+            </a:extLst>
+          </p:cNvPr>
+          <p:cNvCxnSpPr>
+            <a:stCxn id="24" idx="6"/>
+            <a:endCxn id="40" idx="1"/>
+          </p:cNvCxnSpPr>
+          <p:nvPr/>
+        </p:nvCxnSpPr>
+        <p:spPr>
+          <a:xfrm>
+            <a:off x="4609233" y="5394080"/>
+            <a:ext cx="1545380" cy="978"/>
+          </a:xfrm>
+          <a:prstGeom prst="straightConnector1">
+            <a:avLst/>
+          </a:prstGeom>
+          <a:ln>
+            <a:tailEnd type="triangle"/>
+          </a:ln>
+        </p:spPr>
+        <p:style>
+          <a:lnRef idx="1">
+            <a:schemeClr val="accent1"/>
+          </a:lnRef>
+          <a:fillRef idx="0">
+            <a:schemeClr val="accent1"/>
+          </a:fillRef>
+          <a:effectRef idx="0">
+            <a:schemeClr val="accent1"/>
+          </a:effectRef>
+          <a:fontRef idx="minor">
+            <a:schemeClr val="tx1"/>
+          </a:fontRef>
+        </p:style>
+      </p:cxnSp>
+      <p:cxnSp>
+        <p:nvCxnSpPr>
+          <p:cNvPr id="112" name="Connector: Curved 111">
+            <a:extLst>
+              <a:ext uri="{FF2B5EF4-FFF2-40B4-BE49-F238E27FC236}">
+                <a16:creationId xmlns:a16="http://schemas.microsoft.com/office/drawing/2014/main" id="{B64B8D59-31B2-4BE5-AE9D-664EF8F3635A}"/>
+              </a:ext>
+            </a:extLst>
+          </p:cNvPr>
+          <p:cNvCxnSpPr>
+            <a:stCxn id="8" idx="6"/>
+            <a:endCxn id="22" idx="2"/>
+          </p:cNvCxnSpPr>
+          <p:nvPr/>
+        </p:nvCxnSpPr>
+        <p:spPr>
+          <a:xfrm flipV="1">
+            <a:off x="2806597" y="1283411"/>
+            <a:ext cx="1501242" cy="1198893"/>
+          </a:xfrm>
+          <a:prstGeom prst="curvedConnector3">
+            <a:avLst/>
+          </a:prstGeom>
+          <a:ln>
+            <a:tailEnd type="triangle"/>
+          </a:ln>
+        </p:spPr>
+        <p:style>
+          <a:lnRef idx="1">
+            <a:schemeClr val="accent1"/>
+          </a:lnRef>
+          <a:fillRef idx="0">
+            <a:schemeClr val="accent1"/>
+          </a:fillRef>
+          <a:effectRef idx="0">
+            <a:schemeClr val="accent1"/>
+          </a:effectRef>
+          <a:fontRef idx="minor">
+            <a:schemeClr val="tx1"/>
+          </a:fontRef>
+        </p:style>
+      </p:cxnSp>
+      <p:cxnSp>
+        <p:nvCxnSpPr>
+          <p:cNvPr id="114" name="Connector: Curved 113">
+            <a:extLst>
+              <a:ext uri="{FF2B5EF4-FFF2-40B4-BE49-F238E27FC236}">
+                <a16:creationId xmlns:a16="http://schemas.microsoft.com/office/drawing/2014/main" id="{9E612314-ED0E-4E2B-9EE8-82D319676D73}"/>
+              </a:ext>
+            </a:extLst>
+          </p:cNvPr>
+          <p:cNvCxnSpPr>
+            <a:stCxn id="8" idx="6"/>
+            <a:endCxn id="23" idx="2"/>
+          </p:cNvCxnSpPr>
+          <p:nvPr/>
+        </p:nvCxnSpPr>
+        <p:spPr>
+          <a:xfrm>
+            <a:off x="2806597" y="2482304"/>
+            <a:ext cx="1501242" cy="878081"/>
+          </a:xfrm>
+          <a:prstGeom prst="curvedConnector3">
+            <a:avLst/>
+          </a:prstGeom>
+          <a:ln>
+            <a:tailEnd type="triangle"/>
+          </a:ln>
+        </p:spPr>
+        <p:style>
+          <a:lnRef idx="1">
+            <a:schemeClr val="accent1"/>
+          </a:lnRef>
+          <a:fillRef idx="0">
+            <a:schemeClr val="accent1"/>
+          </a:fillRef>
+          <a:effectRef idx="0">
+            <a:schemeClr val="accent1"/>
+          </a:effectRef>
+          <a:fontRef idx="minor">
+            <a:schemeClr val="tx1"/>
+          </a:fontRef>
+        </p:style>
+      </p:cxnSp>
+      <p:cxnSp>
+        <p:nvCxnSpPr>
+          <p:cNvPr id="116" name="Connector: Curved 115">
+            <a:extLst>
+              <a:ext uri="{FF2B5EF4-FFF2-40B4-BE49-F238E27FC236}">
+                <a16:creationId xmlns:a16="http://schemas.microsoft.com/office/drawing/2014/main" id="{BA21A1A2-965D-4069-BD56-D202F6D5960B}"/>
+              </a:ext>
+            </a:extLst>
+          </p:cNvPr>
+          <p:cNvCxnSpPr>
+            <a:stCxn id="8" idx="6"/>
+            <a:endCxn id="24" idx="2"/>
+          </p:cNvCxnSpPr>
+          <p:nvPr/>
+        </p:nvCxnSpPr>
+        <p:spPr>
+          <a:xfrm>
+            <a:off x="2806597" y="2482304"/>
+            <a:ext cx="1501242" cy="2911776"/>
+          </a:xfrm>
+          <a:prstGeom prst="curvedConnector3">
+            <a:avLst>
+              <a:gd name="adj1" fmla="val 25500"/>
+            </a:avLst>
+          </a:prstGeom>
+          <a:ln>
+            <a:tailEnd type="triangle"/>
+          </a:ln>
+        </p:spPr>
+        <p:style>
+          <a:lnRef idx="1">
+            <a:schemeClr val="accent1"/>
+          </a:lnRef>
+          <a:fillRef idx="0">
+            <a:schemeClr val="accent1"/>
+          </a:fillRef>
+          <a:effectRef idx="0">
+            <a:schemeClr val="accent1"/>
+          </a:effectRef>
+          <a:fontRef idx="minor">
+            <a:schemeClr val="tx1"/>
+          </a:fontRef>
+        </p:style>
+      </p:cxnSp>
+      <p:sp>
+        <p:nvSpPr>
+          <p:cNvPr id="118" name="Rectangle 117">
+            <a:extLst>
+              <a:ext uri="{FF2B5EF4-FFF2-40B4-BE49-F238E27FC236}">
+                <a16:creationId xmlns:a16="http://schemas.microsoft.com/office/drawing/2014/main" id="{64D4F3A6-11D7-4B8E-8E62-8A99AAEFFA7C}"/>
+              </a:ext>
+            </a:extLst>
+          </p:cNvPr>
+          <p:cNvSpPr/>
+          <p:nvPr/>
+        </p:nvSpPr>
+        <p:spPr>
+          <a:xfrm>
+            <a:off x="1001242" y="5482822"/>
+            <a:ext cx="209443" cy="209443"/>
+          </a:xfrm>
+          <a:prstGeom prst="rect">
+            <a:avLst/>
+          </a:prstGeom>
+        </p:spPr>
+        <p:style>
+          <a:lnRef idx="2">
+            <a:schemeClr val="accent1">
+              <a:shade val="50000"/>
+            </a:schemeClr>
+          </a:lnRef>
+          <a:fillRef idx="1">
+            <a:schemeClr val="accent1"/>
+          </a:fillRef>
+          <a:effectRef idx="0">
+            <a:schemeClr val="accent1"/>
+          </a:effectRef>
+          <a:fontRef idx="minor">
+            <a:schemeClr val="lt1"/>
+          </a:fontRef>
+        </p:style>
+        <p:txBody>
+          <a:bodyPr rtlCol="0" anchor="ctr"/>
+          <a:lstStyle/>
+          <a:p>
+            <a:pPr algn="ctr"/>
+            <a:endParaRPr lang="en-US"/>
+          </a:p>
+        </p:txBody>
+      </p:sp>
+      <p:sp>
+        <p:nvSpPr>
+          <p:cNvPr id="119" name="TextBox 118">
+            <a:extLst>
+              <a:ext uri="{FF2B5EF4-FFF2-40B4-BE49-F238E27FC236}">
+                <a16:creationId xmlns:a16="http://schemas.microsoft.com/office/drawing/2014/main" id="{DE42A065-E09B-4B81-9977-6F16A23AD931}"/>
+              </a:ext>
+            </a:extLst>
+          </p:cNvPr>
+          <p:cNvSpPr txBox="1"/>
+          <p:nvPr/>
+        </p:nvSpPr>
+        <p:spPr>
+          <a:xfrm>
+            <a:off x="1271987" y="5416413"/>
+            <a:ext cx="2252795" cy="369332"/>
+          </a:xfrm>
+          <a:prstGeom prst="rect">
+            <a:avLst/>
+          </a:prstGeom>
+          <a:noFill/>
+        </p:spPr>
+        <p:txBody>
+          <a:bodyPr wrap="square" rtlCol="0">
+            <a:spAutoFit/>
+          </a:bodyPr>
+          <a:lstStyle/>
+          <a:p>
+            <a:r>
+              <a:rPr lang="en-US" dirty="0"/>
+              <a:t>Generator Templates</a:t>
+            </a:r>
+          </a:p>
+        </p:txBody>
+      </p:sp>
+      <p:sp>
+        <p:nvSpPr>
+          <p:cNvPr id="120" name="Rectangle 119">
+            <a:extLst>
+              <a:ext uri="{FF2B5EF4-FFF2-40B4-BE49-F238E27FC236}">
+                <a16:creationId xmlns:a16="http://schemas.microsoft.com/office/drawing/2014/main" id="{AEBD728C-F7CE-4ED5-A8A6-A7DE5146391A}"/>
+              </a:ext>
+            </a:extLst>
+          </p:cNvPr>
+          <p:cNvSpPr/>
+          <p:nvPr/>
+        </p:nvSpPr>
+        <p:spPr>
+          <a:xfrm>
+            <a:off x="1001242" y="5892169"/>
+            <a:ext cx="209443" cy="209443"/>
+          </a:xfrm>
+          <a:prstGeom prst="rect">
+            <a:avLst/>
+          </a:prstGeom>
+        </p:spPr>
+        <p:style>
+          <a:lnRef idx="2">
+            <a:schemeClr val="accent6">
+              <a:shade val="50000"/>
+            </a:schemeClr>
+          </a:lnRef>
+          <a:fillRef idx="1">
+            <a:schemeClr val="accent6"/>
+          </a:fillRef>
+          <a:effectRef idx="0">
+            <a:schemeClr val="accent6"/>
+          </a:effectRef>
+          <a:fontRef idx="minor">
+            <a:schemeClr val="lt1"/>
+          </a:fontRef>
+        </p:style>
+        <p:txBody>
+          <a:bodyPr rtlCol="0" anchor="ctr"/>
+          <a:lstStyle/>
+          <a:p>
+            <a:pPr algn="ctr"/>
+            <a:endParaRPr lang="en-US"/>
+          </a:p>
+        </p:txBody>
+      </p:sp>
+      <p:sp>
+        <p:nvSpPr>
+          <p:cNvPr id="121" name="TextBox 120">
+            <a:extLst>
+              <a:ext uri="{FF2B5EF4-FFF2-40B4-BE49-F238E27FC236}">
+                <a16:creationId xmlns:a16="http://schemas.microsoft.com/office/drawing/2014/main" id="{49BFD11F-CB2D-46D2-9C17-84131EBB5A98}"/>
+              </a:ext>
+            </a:extLst>
+          </p:cNvPr>
+          <p:cNvSpPr txBox="1"/>
+          <p:nvPr/>
+        </p:nvSpPr>
+        <p:spPr>
+          <a:xfrm>
+            <a:off x="1271987" y="5825760"/>
+            <a:ext cx="3842976" cy="369332"/>
+          </a:xfrm>
+          <a:prstGeom prst="rect">
+            <a:avLst/>
+          </a:prstGeom>
+          <a:noFill/>
+        </p:spPr>
+        <p:txBody>
+          <a:bodyPr wrap="square" rtlCol="0">
+            <a:spAutoFit/>
+          </a:bodyPr>
+          <a:lstStyle/>
+          <a:p>
+            <a:r>
+              <a:rPr lang="en-US" dirty="0"/>
+              <a:t>User </a:t>
+            </a:r>
+            <a:r>
+              <a:rPr lang="en-US" dirty="0" err="1"/>
+              <a:t>Supplie</a:t>
+            </a:r>
+            <a:r>
+              <a:rPr lang="en-US" dirty="0"/>
+              <a:t> YAML Configuration Files</a:t>
+            </a:r>
+          </a:p>
+        </p:txBody>
+      </p:sp>
+      <p:sp>
+        <p:nvSpPr>
+          <p:cNvPr id="122" name="Rectangle 121">
+            <a:extLst>
+              <a:ext uri="{FF2B5EF4-FFF2-40B4-BE49-F238E27FC236}">
+                <a16:creationId xmlns:a16="http://schemas.microsoft.com/office/drawing/2014/main" id="{318660B7-8786-4E8D-B563-79D7F83669F9}"/>
+              </a:ext>
+            </a:extLst>
+          </p:cNvPr>
+          <p:cNvSpPr/>
+          <p:nvPr/>
+        </p:nvSpPr>
+        <p:spPr>
+          <a:xfrm>
+            <a:off x="1001242" y="6301516"/>
+            <a:ext cx="209443" cy="209443"/>
+          </a:xfrm>
+          <a:prstGeom prst="rect">
+            <a:avLst/>
+          </a:prstGeom>
+        </p:spPr>
+        <p:style>
+          <a:lnRef idx="2">
+            <a:schemeClr val="accent2">
+              <a:shade val="50000"/>
+            </a:schemeClr>
+          </a:lnRef>
+          <a:fillRef idx="1">
+            <a:schemeClr val="accent2"/>
+          </a:fillRef>
+          <a:effectRef idx="0">
+            <a:schemeClr val="accent2"/>
+          </a:effectRef>
+          <a:fontRef idx="minor">
+            <a:schemeClr val="lt1"/>
+          </a:fontRef>
+        </p:style>
+        <p:txBody>
+          <a:bodyPr rtlCol="0" anchor="ctr"/>
+          <a:lstStyle/>
+          <a:p>
+            <a:pPr algn="ctr"/>
+            <a:endParaRPr lang="en-US"/>
+          </a:p>
+        </p:txBody>
+      </p:sp>
+      <p:sp>
+        <p:nvSpPr>
+          <p:cNvPr id="123" name="TextBox 122">
+            <a:extLst>
+              <a:ext uri="{FF2B5EF4-FFF2-40B4-BE49-F238E27FC236}">
+                <a16:creationId xmlns:a16="http://schemas.microsoft.com/office/drawing/2014/main" id="{13595835-06E3-471C-BD00-357782F18883}"/>
+              </a:ext>
+            </a:extLst>
+          </p:cNvPr>
+          <p:cNvSpPr txBox="1"/>
+          <p:nvPr/>
+        </p:nvSpPr>
+        <p:spPr>
+          <a:xfrm>
+            <a:off x="1271987" y="6235107"/>
+            <a:ext cx="1869667" cy="369332"/>
+          </a:xfrm>
+          <a:prstGeom prst="rect">
+            <a:avLst/>
+          </a:prstGeom>
+          <a:noFill/>
+        </p:spPr>
+        <p:txBody>
+          <a:bodyPr wrap="square" rtlCol="0">
+            <a:spAutoFit/>
+          </a:bodyPr>
+          <a:lstStyle/>
+          <a:p>
+            <a:r>
+              <a:rPr lang="en-US" dirty="0"/>
+              <a:t>Generated Code</a:t>
+            </a:r>
+          </a:p>
+        </p:txBody>
+      </p:sp>
+    </p:spTree>
+    <p:extLst>
+      <p:ext uri="{BB962C8B-B14F-4D97-AF65-F5344CB8AC3E}">
+        <p14:creationId xmlns:p14="http://schemas.microsoft.com/office/powerpoint/2010/main" val="2141212257"/>
       </p:ext>
     </p:extLst>
   </p:cSld>

</xml_diff>